<commit_message>
Completed first version of SCP-UA proxy; started with OS-SCU proxy; added use cases to README
</commit_message>
<xml_diff>
--- a/documents/supNNN_fr_DICOMwebModalityServices.20240531.pptx
+++ b/documents/supNNN_fr_DICOMwebModalityServices.20240531.pptx
@@ -6052,7 +6052,7 @@
             </a:r>
             <a:r>
               <a:rPr lang="en-US" sz="1600" dirty="0"/>
-              <a:t>	 Suspend Global </a:t>
+              <a:t>	Suspend Global </a:t>
             </a:r>
             <a:r>
               <a:rPr lang="en-US" sz="1600" dirty="0" err="1"/>
@@ -6191,13 +6191,13 @@
   <p:clrMapOvr>
     <a:masterClrMapping/>
   </p:clrMapOvr>
-  <mc:AlternateContent xmlns:mc="http://schemas.openxmlformats.org/markup-compatibility/2006">
-    <mc:Choice xmlns:p14="http://schemas.microsoft.com/office/powerpoint/2010/main" Requires="p14">
+  <mc:AlternateContent xmlns:mc="http://schemas.openxmlformats.org/markup-compatibility/2006" xmlns:p14="http://schemas.microsoft.com/office/powerpoint/2010/main">
+    <mc:Choice Requires="p14">
       <p:transition spd="med" p14:dur="700">
         <p:fade/>
       </p:transition>
     </mc:Choice>
-    <mc:Fallback>
+    <mc:Fallback xmlns="">
       <p:transition spd="med">
         <p:fade/>
       </p:transition>
@@ -7709,13 +7709,13 @@
   <p:clrMapOvr>
     <a:masterClrMapping/>
   </p:clrMapOvr>
-  <mc:AlternateContent xmlns:mc="http://schemas.openxmlformats.org/markup-compatibility/2006">
-    <mc:Choice xmlns:p14="http://schemas.microsoft.com/office/powerpoint/2010/main" Requires="p14">
+  <mc:AlternateContent xmlns:mc="http://schemas.openxmlformats.org/markup-compatibility/2006" xmlns:p14="http://schemas.microsoft.com/office/powerpoint/2010/main">
+    <mc:Choice Requires="p14">
       <p:transition spd="med" p14:dur="700">
         <p:fade/>
       </p:transition>
     </mc:Choice>
-    <mc:Fallback>
+    <mc:Fallback xmlns="">
       <p:transition spd="med">
         <p:fade/>
       </p:transition>
@@ -7910,13 +7910,13 @@
   <p:clrMapOvr>
     <a:masterClrMapping/>
   </p:clrMapOvr>
-  <mc:AlternateContent xmlns:mc="http://schemas.openxmlformats.org/markup-compatibility/2006">
-    <mc:Choice xmlns:p14="http://schemas.microsoft.com/office/powerpoint/2010/main" Requires="p14">
+  <mc:AlternateContent xmlns:mc="http://schemas.openxmlformats.org/markup-compatibility/2006" xmlns:p14="http://schemas.microsoft.com/office/powerpoint/2010/main">
+    <mc:Choice Requires="p14">
       <p:transition spd="med" p14:dur="700">
         <p:fade/>
       </p:transition>
     </mc:Choice>
-    <mc:Fallback>
+    <mc:Fallback xmlns="">
       <p:transition spd="med">
         <p:fade/>
       </p:transition>
@@ -11367,13 +11367,13 @@
   <p:clrMapOvr>
     <a:masterClrMapping/>
   </p:clrMapOvr>
-  <mc:AlternateContent xmlns:mc="http://schemas.openxmlformats.org/markup-compatibility/2006">
-    <mc:Choice xmlns:p14="http://schemas.microsoft.com/office/powerpoint/2010/main" Requires="p14">
+  <mc:AlternateContent xmlns:mc="http://schemas.openxmlformats.org/markup-compatibility/2006" xmlns:p14="http://schemas.microsoft.com/office/powerpoint/2010/main">
+    <mc:Choice Requires="p14">
       <p:transition spd="med" p14:dur="700">
         <p:fade/>
       </p:transition>
     </mc:Choice>
-    <mc:Fallback>
+    <mc:Fallback xmlns="">
       <p:transition spd="med">
         <p:fade/>
       </p:transition>
@@ -13337,13 +13337,13 @@
   <p:clrMapOvr>
     <a:masterClrMapping/>
   </p:clrMapOvr>
-  <mc:AlternateContent xmlns:mc="http://schemas.openxmlformats.org/markup-compatibility/2006">
-    <mc:Choice xmlns:p14="http://schemas.microsoft.com/office/powerpoint/2010/main" Requires="p14">
+  <mc:AlternateContent xmlns:mc="http://schemas.openxmlformats.org/markup-compatibility/2006" xmlns:p14="http://schemas.microsoft.com/office/powerpoint/2010/main">
+    <mc:Choice Requires="p14">
       <p:transition spd="med" p14:dur="700">
         <p:fade/>
       </p:transition>
     </mc:Choice>
-    <mc:Fallback>
+    <mc:Fallback xmlns="">
       <p:transition spd="med">
         <p:fade/>
       </p:transition>
@@ -15098,13 +15098,13 @@
   <p:clrMapOvr>
     <a:masterClrMapping/>
   </p:clrMapOvr>
-  <mc:AlternateContent xmlns:mc="http://schemas.openxmlformats.org/markup-compatibility/2006">
-    <mc:Choice xmlns:p14="http://schemas.microsoft.com/office/powerpoint/2010/main" Requires="p14">
+  <mc:AlternateContent xmlns:mc="http://schemas.openxmlformats.org/markup-compatibility/2006" xmlns:p14="http://schemas.microsoft.com/office/powerpoint/2010/main">
+    <mc:Choice Requires="p14">
       <p:transition spd="med" p14:dur="700">
         <p:fade/>
       </p:transition>
     </mc:Choice>
-    <mc:Fallback>
+    <mc:Fallback xmlns="">
       <p:transition spd="med">
         <p:fade/>
       </p:transition>

</xml_diff>